<commit_message>
Finished proof, edite figure, gitignore updated
</commit_message>
<xml_diff>
--- a/Pubs/CDC16/Paper/figs/OverReachFigure.pptx
+++ b/Pubs/CDC16/Paper/figs/OverReachFigure.pptx
@@ -288,7 +288,7 @@
           <a:p>
             <a:fld id="{2D15D275-A332-439B-8539-769CB1C78085}" type="datetimeFigureOut">
               <a:rPr lang="en-US" smtClean="0"/>
-              <a:t>3/8/2016</a:t>
+              <a:t>3/10/2016</a:t>
             </a:fld>
             <a:endParaRPr lang="en-US"/>
           </a:p>
@@ -458,7 +458,7 @@
           <a:p>
             <a:fld id="{2D15D275-A332-439B-8539-769CB1C78085}" type="datetimeFigureOut">
               <a:rPr lang="en-US" smtClean="0"/>
-              <a:t>3/8/2016</a:t>
+              <a:t>3/10/2016</a:t>
             </a:fld>
             <a:endParaRPr lang="en-US"/>
           </a:p>
@@ -638,7 +638,7 @@
           <a:p>
             <a:fld id="{2D15D275-A332-439B-8539-769CB1C78085}" type="datetimeFigureOut">
               <a:rPr lang="en-US" smtClean="0"/>
-              <a:t>3/8/2016</a:t>
+              <a:t>3/10/2016</a:t>
             </a:fld>
             <a:endParaRPr lang="en-US"/>
           </a:p>
@@ -808,7 +808,7 @@
           <a:p>
             <a:fld id="{2D15D275-A332-439B-8539-769CB1C78085}" type="datetimeFigureOut">
               <a:rPr lang="en-US" smtClean="0"/>
-              <a:t>3/8/2016</a:t>
+              <a:t>3/10/2016</a:t>
             </a:fld>
             <a:endParaRPr lang="en-US"/>
           </a:p>
@@ -1054,7 +1054,7 @@
           <a:p>
             <a:fld id="{2D15D275-A332-439B-8539-769CB1C78085}" type="datetimeFigureOut">
               <a:rPr lang="en-US" smtClean="0"/>
-              <a:t>3/8/2016</a:t>
+              <a:t>3/10/2016</a:t>
             </a:fld>
             <a:endParaRPr lang="en-US"/>
           </a:p>
@@ -1342,7 +1342,7 @@
           <a:p>
             <a:fld id="{2D15D275-A332-439B-8539-769CB1C78085}" type="datetimeFigureOut">
               <a:rPr lang="en-US" smtClean="0"/>
-              <a:t>3/8/2016</a:t>
+              <a:t>3/10/2016</a:t>
             </a:fld>
             <a:endParaRPr lang="en-US"/>
           </a:p>
@@ -1764,7 +1764,7 @@
           <a:p>
             <a:fld id="{2D15D275-A332-439B-8539-769CB1C78085}" type="datetimeFigureOut">
               <a:rPr lang="en-US" smtClean="0"/>
-              <a:t>3/8/2016</a:t>
+              <a:t>3/10/2016</a:t>
             </a:fld>
             <a:endParaRPr lang="en-US"/>
           </a:p>
@@ -1882,7 +1882,7 @@
           <a:p>
             <a:fld id="{2D15D275-A332-439B-8539-769CB1C78085}" type="datetimeFigureOut">
               <a:rPr lang="en-US" smtClean="0"/>
-              <a:t>3/8/2016</a:t>
+              <a:t>3/10/2016</a:t>
             </a:fld>
             <a:endParaRPr lang="en-US"/>
           </a:p>
@@ -1977,7 +1977,7 @@
           <a:p>
             <a:fld id="{2D15D275-A332-439B-8539-769CB1C78085}" type="datetimeFigureOut">
               <a:rPr lang="en-US" smtClean="0"/>
-              <a:t>3/8/2016</a:t>
+              <a:t>3/10/2016</a:t>
             </a:fld>
             <a:endParaRPr lang="en-US"/>
           </a:p>
@@ -2254,7 +2254,7 @@
           <a:p>
             <a:fld id="{2D15D275-A332-439B-8539-769CB1C78085}" type="datetimeFigureOut">
               <a:rPr lang="en-US" smtClean="0"/>
-              <a:t>3/8/2016</a:t>
+              <a:t>3/10/2016</a:t>
             </a:fld>
             <a:endParaRPr lang="en-US"/>
           </a:p>
@@ -2507,7 +2507,7 @@
           <a:p>
             <a:fld id="{2D15D275-A332-439B-8539-769CB1C78085}" type="datetimeFigureOut">
               <a:rPr lang="en-US" smtClean="0"/>
-              <a:t>3/8/2016</a:t>
+              <a:t>3/10/2016</a:t>
             </a:fld>
             <a:endParaRPr lang="en-US"/>
           </a:p>
@@ -2720,7 +2720,7 @@
           <a:p>
             <a:fld id="{2D15D275-A332-439B-8539-769CB1C78085}" type="datetimeFigureOut">
               <a:rPr lang="en-US" smtClean="0"/>
-              <a:t>3/8/2016</a:t>
+              <a:t>3/10/2016</a:t>
             </a:fld>
             <a:endParaRPr lang="en-US"/>
           </a:p>
@@ -3222,8 +3222,8 @@
           </a:fontRef>
         </p:style>
       </p:cxnSp>
-      <mc:AlternateContent xmlns:mc="http://schemas.openxmlformats.org/markup-compatibility/2006">
-        <mc:Choice xmlns:a14="http://schemas.microsoft.com/office/drawing/2010/main" Requires="a14">
+      <mc:AlternateContent xmlns:mc="http://schemas.openxmlformats.org/markup-compatibility/2006" xmlns:a14="http://schemas.microsoft.com/office/drawing/2010/main">
+        <mc:Choice Requires="a14">
           <p:sp>
             <p:nvSpPr>
               <p:cNvPr id="8" name="TextBox 7"/>
@@ -3246,6 +3246,7 @@
               </a:bodyPr>
               <a:lstStyle/>
               <a:p>
+                <a:pPr/>
                 <a14:m>
                   <m:oMathPara xmlns:m="http://schemas.openxmlformats.org/officeDocument/2006/math">
                     <m:oMathParaPr>
@@ -3284,7 +3285,7 @@
             </p:txBody>
           </p:sp>
         </mc:Choice>
-        <mc:Fallback>
+        <mc:Fallback xmlns="">
           <p:sp>
             <p:nvSpPr>
               <p:cNvPr id="8" name="TextBox 7"/>
@@ -3359,8 +3360,8 @@
           </a:fontRef>
         </p:style>
       </p:cxnSp>
-      <mc:AlternateContent xmlns:mc="http://schemas.openxmlformats.org/markup-compatibility/2006">
-        <mc:Choice xmlns:a14="http://schemas.microsoft.com/office/drawing/2010/main" Requires="a14">
+      <mc:AlternateContent xmlns:mc="http://schemas.openxmlformats.org/markup-compatibility/2006" xmlns:a14="http://schemas.microsoft.com/office/drawing/2010/main">
+        <mc:Choice Requires="a14">
           <p:sp>
             <p:nvSpPr>
               <p:cNvPr id="12" name="TextBox 11"/>
@@ -3383,6 +3384,7 @@
               </a:bodyPr>
               <a:lstStyle/>
               <a:p>
+                <a:pPr/>
                 <a14:m>
                   <m:oMathPara xmlns:m="http://schemas.openxmlformats.org/officeDocument/2006/math">
                     <m:oMathParaPr>
@@ -3478,7 +3480,7 @@
             </p:txBody>
           </p:sp>
         </mc:Choice>
-        <mc:Fallback>
+        <mc:Fallback xmlns="">
           <p:sp>
             <p:nvSpPr>
               <p:cNvPr id="12" name="TextBox 11"/>
@@ -3625,8 +3627,8 @@
           </a:p>
         </p:txBody>
       </p:sp>
-      <mc:AlternateContent xmlns:mc="http://schemas.openxmlformats.org/markup-compatibility/2006">
-        <mc:Choice xmlns:a14="http://schemas.microsoft.com/office/drawing/2010/main" Requires="a14">
+      <mc:AlternateContent xmlns:mc="http://schemas.openxmlformats.org/markup-compatibility/2006" xmlns:a14="http://schemas.microsoft.com/office/drawing/2010/main">
+        <mc:Choice Requires="a14">
           <p:sp>
             <p:nvSpPr>
               <p:cNvPr id="21" name="TextBox 20"/>
@@ -3649,6 +3651,7 @@
               </a:bodyPr>
               <a:lstStyle/>
               <a:p>
+                <a:pPr/>
                 <a14:m>
                   <m:oMathPara xmlns:m="http://schemas.openxmlformats.org/officeDocument/2006/math">
                     <m:oMathParaPr>
@@ -3718,7 +3721,7 @@
             </p:txBody>
           </p:sp>
         </mc:Choice>
-        <mc:Fallback>
+        <mc:Fallback xmlns="">
           <p:sp>
             <p:nvSpPr>
               <p:cNvPr id="21" name="TextBox 20"/>
@@ -3943,8 +3946,8 @@
         </p:nvCxnSpPr>
         <p:spPr>
           <a:xfrm flipV="1">
-            <a:off x="3962400" y="1770615"/>
-            <a:ext cx="978665" cy="228575"/>
+            <a:off x="3962400" y="1922815"/>
+            <a:ext cx="1435865" cy="76376"/>
           </a:xfrm>
           <a:prstGeom prst="line">
             <a:avLst/>
@@ -3974,7 +3977,7 @@
         <p:spPr>
           <a:xfrm>
             <a:off x="4038600" y="2438400"/>
-            <a:ext cx="902465" cy="57143"/>
+            <a:ext cx="1359665" cy="167355"/>
           </a:xfrm>
           <a:prstGeom prst="line">
             <a:avLst/>
@@ -4005,7 +4008,7 @@
             </p:nvSpPr>
             <p:spPr>
               <a:xfrm>
-                <a:off x="4152900" y="2743200"/>
+                <a:off x="3359225" y="4114800"/>
                 <a:ext cx="1712205" cy="307777"/>
               </a:xfrm>
               <a:prstGeom prst="rect">
@@ -4019,6 +4022,7 @@
               </a:bodyPr>
               <a:lstStyle/>
               <a:p>
+                <a:pPr/>
                 <a14:m>
                   <m:oMathPara xmlns:m="http://schemas.openxmlformats.org/officeDocument/2006/math">
                     <m:oMathParaPr>
@@ -4041,20 +4045,7 @@
                         <a:rPr lang="en-US" sz="1400" b="0" i="1" baseline="-25000" smtClean="0">
                           <a:latin typeface="Cambria Math"/>
                         </a:rPr>
-                        <m:t>+</m:t>
-                      </m:r>
-                      <m:r>
-                        <a:rPr lang="en-US" sz="1400" b="0" i="1" baseline="-25000" smtClean="0">
-                          <a:latin typeface="Cambria Math"/>
-                        </a:rPr>
-                        <m:t>1</m:t>
-                      </m:r>
-                      <m:r>
-                        <a:rPr lang="en-US" sz="1400" b="0" i="1" smtClean="0">
-                          <a:latin typeface="Cambria Math"/>
-                          <a:ea typeface="Cambria Math"/>
-                        </a:rPr>
-                        <m:t>∈</m:t>
+                        <m:t>+1∈</m:t>
                       </m:r>
                       <m:acc>
                         <m:accPr>
@@ -4084,19 +4075,7 @@
                         <a:rPr lang="en-US" sz="1400" b="0" i="1" baseline="-25000" smtClean="0">
                           <a:latin typeface="Cambria Math"/>
                         </a:rPr>
-                        <m:t>+</m:t>
-                      </m:r>
-                      <m:r>
-                        <a:rPr lang="en-US" sz="1400" b="0" i="1" baseline="-25000" smtClean="0">
-                          <a:latin typeface="Cambria Math"/>
-                        </a:rPr>
-                        <m:t>1</m:t>
-                      </m:r>
-                      <m:r>
-                        <a:rPr lang="en-US" sz="1400" b="0" i="1" baseline="-25000" smtClean="0">
-                          <a:latin typeface="Cambria Math"/>
-                        </a:rPr>
-                        <m:t>|</m:t>
+                        <m:t>+1|</m:t>
                       </m:r>
                       <m:r>
                         <a:rPr lang="en-US" sz="1400" b="0" i="1" baseline="-25000" smtClean="0">
@@ -4108,13 +4087,7 @@
                         <a:rPr lang="en-US" sz="1400" b="0" i="1" baseline="-25000" smtClean="0">
                           <a:latin typeface="Cambria Math"/>
                         </a:rPr>
-                        <m:t>+</m:t>
-                      </m:r>
-                      <m:r>
-                        <a:rPr lang="en-US" sz="1400" b="0" i="1" baseline="-25000" smtClean="0">
-                          <a:latin typeface="Cambria Math"/>
-                        </a:rPr>
-                        <m:t>1</m:t>
+                        <m:t>+1</m:t>
                       </m:r>
                     </m:oMath>
                   </m:oMathPara>
@@ -4135,7 +4108,7 @@
             </p:nvSpPr>
             <p:spPr>
               <a:xfrm>
-                <a:off x="4152900" y="2743200"/>
+                <a:off x="3359225" y="4114800"/>
                 <a:ext cx="1712205" cy="307777"/>
               </a:xfrm>
               <a:prstGeom prst="rect">
@@ -4171,7 +4144,7 @@
         </p:nvSpPr>
         <p:spPr>
           <a:xfrm>
-            <a:off x="4941065" y="1770615"/>
+            <a:off x="5398265" y="1922815"/>
             <a:ext cx="697735" cy="743985"/>
           </a:xfrm>
           <a:prstGeom prst="rect">
@@ -4219,7 +4192,7 @@
         <p:spPr>
           <a:xfrm flipV="1">
             <a:off x="4197426" y="990600"/>
-            <a:ext cx="254306" cy="149423"/>
+            <a:ext cx="874004" cy="149424"/>
           </a:xfrm>
           <a:prstGeom prst="line">
             <a:avLst/>
@@ -4249,7 +4222,7 @@
         <p:spPr>
           <a:xfrm>
             <a:off x="4191000" y="2537365"/>
-            <a:ext cx="260732" cy="136780"/>
+            <a:ext cx="880430" cy="129435"/>
           </a:xfrm>
           <a:prstGeom prst="line">
             <a:avLst/>
@@ -4278,7 +4251,7 @@
         </p:nvSpPr>
         <p:spPr>
           <a:xfrm>
-            <a:off x="4451732" y="987027"/>
+            <a:off x="5071430" y="987027"/>
             <a:ext cx="1644268" cy="1687117"/>
           </a:xfrm>
           <a:prstGeom prst="rect">
@@ -4311,6 +4284,127 @@
           <a:p>
             <a:pPr algn="ctr"/>
             <a:endParaRPr lang="en-US"/>
+          </a:p>
+        </p:txBody>
+      </p:sp>
+      <p:sp>
+        <p:nvSpPr>
+          <p:cNvPr id="30" name="Rectangle 29"/>
+          <p:cNvSpPr/>
+          <p:nvPr/>
+        </p:nvSpPr>
+        <p:spPr>
+          <a:xfrm>
+            <a:off x="4800600" y="762000"/>
+            <a:ext cx="2133600" cy="2209800"/>
+          </a:xfrm>
+          <a:prstGeom prst="rect">
+            <a:avLst/>
+          </a:prstGeom>
+          <a:noFill/>
+          <a:ln>
+            <a:prstDash val="solid"/>
+          </a:ln>
+        </p:spPr>
+        <p:style>
+          <a:lnRef idx="2">
+            <a:schemeClr val="accent1">
+              <a:shade val="50000"/>
+            </a:schemeClr>
+          </a:lnRef>
+          <a:fillRef idx="1">
+            <a:schemeClr val="accent1"/>
+          </a:fillRef>
+          <a:effectRef idx="0">
+            <a:schemeClr val="accent1"/>
+          </a:effectRef>
+          <a:fontRef idx="minor">
+            <a:schemeClr val="lt1"/>
+          </a:fontRef>
+        </p:style>
+        <p:txBody>
+          <a:bodyPr rtlCol="0" anchor="ctr"/>
+          <a:lstStyle/>
+          <a:p>
+            <a:pPr algn="ctr"/>
+            <a:endParaRPr lang="en-US"/>
+          </a:p>
+        </p:txBody>
+      </p:sp>
+      <p:sp>
+        <p:nvSpPr>
+          <p:cNvPr id="31" name="Rectangle 30"/>
+          <p:cNvSpPr/>
+          <p:nvPr/>
+        </p:nvSpPr>
+        <p:spPr>
+          <a:xfrm>
+            <a:off x="5143040" y="1689674"/>
+            <a:ext cx="1181559" cy="1282125"/>
+          </a:xfrm>
+          <a:prstGeom prst="rect">
+            <a:avLst/>
+          </a:prstGeom>
+          <a:noFill/>
+          <a:ln>
+            <a:solidFill>
+              <a:schemeClr val="tx1"/>
+            </a:solidFill>
+            <a:prstDash val="solid"/>
+          </a:ln>
+        </p:spPr>
+        <p:style>
+          <a:lnRef idx="2">
+            <a:schemeClr val="accent1">
+              <a:shade val="50000"/>
+            </a:schemeClr>
+          </a:lnRef>
+          <a:fillRef idx="1">
+            <a:schemeClr val="accent1"/>
+          </a:fillRef>
+          <a:effectRef idx="0">
+            <a:schemeClr val="accent1"/>
+          </a:effectRef>
+          <a:fontRef idx="minor">
+            <a:schemeClr val="lt1"/>
+          </a:fontRef>
+        </p:style>
+        <p:txBody>
+          <a:bodyPr rtlCol="0" anchor="ctr"/>
+          <a:lstStyle/>
+          <a:p>
+            <a:pPr algn="ctr"/>
+            <a:endParaRPr lang="en-US"/>
+          </a:p>
+        </p:txBody>
+      </p:sp>
+      <p:sp>
+        <p:nvSpPr>
+          <p:cNvPr id="14" name="TextBox 13"/>
+          <p:cNvSpPr txBox="1"/>
+          <p:nvPr/>
+        </p:nvSpPr>
+        <p:spPr>
+          <a:xfrm>
+            <a:off x="7391400" y="1600200"/>
+            <a:ext cx="685800" cy="584775"/>
+          </a:xfrm>
+          <a:prstGeom prst="rect">
+            <a:avLst/>
+          </a:prstGeom>
+          <a:noFill/>
+        </p:spPr>
+        <p:txBody>
+          <a:bodyPr wrap="square" rtlCol="0">
+            <a:spAutoFit/>
+          </a:bodyPr>
+          <a:lstStyle/>
+          <a:p>
+            <a:r>
+              <a:rPr lang="en-US" sz="3200" b="1" dirty="0" smtClean="0"/>
+              <a:t>…</a:t>
+            </a:r>
+            <a:endParaRPr lang="en-US" sz="3200" b="1" dirty="0"/>
           </a:p>
         </p:txBody>
       </p:sp>

</xml_diff>